<commit_message>
~repo shoot secure commit
</commit_message>
<xml_diff>
--- a/Documentation/Annexes/API/MaquettesBetaAPI.pptx
+++ b/Documentation/Annexes/API/MaquettesBetaAPI.pptx
@@ -220,9 +220,9 @@
     </p:extLst>
   </p:cm>
   <p:cm authorId="1" dt="2017-02-07T11:22:51.174" idx="10">
-    <p:pos x="2592" y="6074"/>
+    <p:pos x="2429" y="6541"/>
     <p:text>Ces 2 champs n'apparaissent que si entrainement est séléctionné</p:text>
-    <p:extLst>
+    <p:extLst mod="1">
       <p:ext uri="{C676402C-5697-4E1C-873F-D02D1690AC5C}">
         <p15:threadingInfo xmlns:p15="http://schemas.microsoft.com/office/powerpoint/2012/main" timeZoneBias="-60"/>
       </p:ext>
@@ -354,7 +354,7 @@
           <a:p>
             <a:fld id="{4E79D35C-F1F6-4862-93A6-B3FCF3F9E713}" type="datetimeFigureOut">
               <a:rPr lang="fr-CH" smtClean="0"/>
-              <a:t>07.02.2017</a:t>
+              <a:t>22.02.2017</a:t>
             </a:fld>
             <a:endParaRPr lang="fr-CH"/>
           </a:p>
@@ -1379,7 +1379,6 @@
               <a:rPr lang="en-US" baseline="0" dirty="0" smtClean="0"/>
               <a:t>/shoots</a:t>
             </a:r>
-            <a:endParaRPr lang="en-US" baseline="0" dirty="0" smtClean="0"/>
           </a:p>
           <a:p>
             <a:r>
@@ -1628,7 +1627,20 @@
           <a:p>
             <a:r>
               <a:rPr lang="en-US" dirty="0" smtClean="0"/>
-              <a:t>POST /</a:t>
+              <a:t>http://shoot4stats.tk/#/addArrows</a:t>
+            </a:r>
+          </a:p>
+          <a:p>
+            <a:endParaRPr lang="en-US" dirty="0" smtClean="0"/>
+          </a:p>
+          <a:p>
+            <a:r>
+              <a:rPr lang="en-US" dirty="0" smtClean="0"/>
+              <a:t>POST </a:t>
+            </a:r>
+            <a:r>
+              <a:rPr lang="en-US" dirty="0" smtClean="0"/>
+              <a:t>/</a:t>
             </a:r>
             <a:r>
               <a:rPr lang="en-US" dirty="0" err="1" smtClean="0"/>
@@ -1906,7 +1918,7 @@
           <a:p>
             <a:fld id="{A9D12CAE-3F76-4D1A-9732-C82BD9FD497E}" type="datetimeFigureOut">
               <a:rPr lang="fr-CH" smtClean="0"/>
-              <a:t>07.02.2017</a:t>
+              <a:t>22.02.2017</a:t>
             </a:fld>
             <a:endParaRPr lang="fr-CH"/>
           </a:p>
@@ -2076,7 +2088,7 @@
           <a:p>
             <a:fld id="{A9D12CAE-3F76-4D1A-9732-C82BD9FD497E}" type="datetimeFigureOut">
               <a:rPr lang="fr-CH" smtClean="0"/>
-              <a:t>07.02.2017</a:t>
+              <a:t>22.02.2017</a:t>
             </a:fld>
             <a:endParaRPr lang="fr-CH"/>
           </a:p>
@@ -2256,7 +2268,7 @@
           <a:p>
             <a:fld id="{A9D12CAE-3F76-4D1A-9732-C82BD9FD497E}" type="datetimeFigureOut">
               <a:rPr lang="fr-CH" smtClean="0"/>
-              <a:t>07.02.2017</a:t>
+              <a:t>22.02.2017</a:t>
             </a:fld>
             <a:endParaRPr lang="fr-CH"/>
           </a:p>
@@ -2426,7 +2438,7 @@
           <a:p>
             <a:fld id="{A9D12CAE-3F76-4D1A-9732-C82BD9FD497E}" type="datetimeFigureOut">
               <a:rPr lang="fr-CH" smtClean="0"/>
-              <a:t>07.02.2017</a:t>
+              <a:t>22.02.2017</a:t>
             </a:fld>
             <a:endParaRPr lang="fr-CH"/>
           </a:p>
@@ -2670,7 +2682,7 @@
           <a:p>
             <a:fld id="{A9D12CAE-3F76-4D1A-9732-C82BD9FD497E}" type="datetimeFigureOut">
               <a:rPr lang="fr-CH" smtClean="0"/>
-              <a:t>07.02.2017</a:t>
+              <a:t>22.02.2017</a:t>
             </a:fld>
             <a:endParaRPr lang="fr-CH"/>
           </a:p>
@@ -2902,7 +2914,7 @@
           <a:p>
             <a:fld id="{A9D12CAE-3F76-4D1A-9732-C82BD9FD497E}" type="datetimeFigureOut">
               <a:rPr lang="fr-CH" smtClean="0"/>
-              <a:t>07.02.2017</a:t>
+              <a:t>22.02.2017</a:t>
             </a:fld>
             <a:endParaRPr lang="fr-CH"/>
           </a:p>
@@ -3269,7 +3281,7 @@
           <a:p>
             <a:fld id="{A9D12CAE-3F76-4D1A-9732-C82BD9FD497E}" type="datetimeFigureOut">
               <a:rPr lang="fr-CH" smtClean="0"/>
-              <a:t>07.02.2017</a:t>
+              <a:t>22.02.2017</a:t>
             </a:fld>
             <a:endParaRPr lang="fr-CH"/>
           </a:p>
@@ -3387,7 +3399,7 @@
           <a:p>
             <a:fld id="{A9D12CAE-3F76-4D1A-9732-C82BD9FD497E}" type="datetimeFigureOut">
               <a:rPr lang="fr-CH" smtClean="0"/>
-              <a:t>07.02.2017</a:t>
+              <a:t>22.02.2017</a:t>
             </a:fld>
             <a:endParaRPr lang="fr-CH"/>
           </a:p>
@@ -3482,7 +3494,7 @@
           <a:p>
             <a:fld id="{A9D12CAE-3F76-4D1A-9732-C82BD9FD497E}" type="datetimeFigureOut">
               <a:rPr lang="fr-CH" smtClean="0"/>
-              <a:t>07.02.2017</a:t>
+              <a:t>22.02.2017</a:t>
             </a:fld>
             <a:endParaRPr lang="fr-CH"/>
           </a:p>
@@ -3759,7 +3771,7 @@
           <a:p>
             <a:fld id="{A9D12CAE-3F76-4D1A-9732-C82BD9FD497E}" type="datetimeFigureOut">
               <a:rPr lang="fr-CH" smtClean="0"/>
-              <a:t>07.02.2017</a:t>
+              <a:t>22.02.2017</a:t>
             </a:fld>
             <a:endParaRPr lang="fr-CH"/>
           </a:p>
@@ -4016,7 +4028,7 @@
           <a:p>
             <a:fld id="{A9D12CAE-3F76-4D1A-9732-C82BD9FD497E}" type="datetimeFigureOut">
               <a:rPr lang="fr-CH" smtClean="0"/>
-              <a:t>07.02.2017</a:t>
+              <a:t>22.02.2017</a:t>
             </a:fld>
             <a:endParaRPr lang="fr-CH"/>
           </a:p>
@@ -4229,7 +4241,7 @@
           <a:p>
             <a:fld id="{A9D12CAE-3F76-4D1A-9732-C82BD9FD497E}" type="datetimeFigureOut">
               <a:rPr lang="fr-CH" smtClean="0"/>
-              <a:t>07.02.2017</a:t>
+              <a:t>22.02.2017</a:t>
             </a:fld>
             <a:endParaRPr lang="fr-CH"/>
           </a:p>
@@ -6627,11 +6639,7 @@
           <a:p>
             <a:r>
               <a:rPr lang="en-US" sz="2400" dirty="0" smtClean="0"/>
-              <a:t>Title </a:t>
-            </a:r>
-            <a:r>
-              <a:rPr lang="en-US" sz="2400" dirty="0" smtClean="0"/>
-              <a:t>: </a:t>
+              <a:t>Title : </a:t>
             </a:r>
           </a:p>
           <a:p>
@@ -7102,7 +7110,7 @@
           <a:p>
             <a:r>
               <a:rPr lang="en-US" dirty="0" smtClean="0"/>
-              <a:t>Indoor</a:t>
+              <a:t>Indoor		20 ends 3Arrows/End</a:t>
             </a:r>
             <a:endParaRPr lang="fr-CH" dirty="0"/>
           </a:p>
@@ -7132,7 +7140,7 @@
           <a:p>
             <a:r>
               <a:rPr lang="en-US" dirty="0" smtClean="0"/>
-              <a:t>Outdoor</a:t>
+              <a:t>Outdoor		12 Ends 6Arrows/End</a:t>
             </a:r>
             <a:endParaRPr lang="fr-CH" dirty="0"/>
           </a:p>
@@ -7211,7 +7219,7 @@
         </p:nvSpPr>
         <p:spPr>
           <a:xfrm>
-            <a:off x="2841171" y="10425391"/>
+            <a:off x="4201886" y="9975979"/>
             <a:ext cx="1910443" cy="369332"/>
           </a:xfrm>
           <a:prstGeom prst="rect">

</xml_diff>